<commit_message>
Report and ppt of section 5
</commit_message>
<xml_diff>
--- a/section5/section5.pptx
+++ b/section5/section5.pptx
@@ -5,11 +5,15 @@
     <p:sldMasterId id="2147483648" r:id="rId1"/>
   </p:sldMasterIdLst>
   <p:notesMasterIdLst>
-    <p:notesMasterId r:id="rId4"/>
+    <p:notesMasterId r:id="rId8"/>
   </p:notesMasterIdLst>
   <p:sldIdLst>
     <p:sldId id="256" r:id="rId2"/>
     <p:sldId id="257" r:id="rId3"/>
+    <p:sldId id="258" r:id="rId4"/>
+    <p:sldId id="259" r:id="rId5"/>
+    <p:sldId id="260" r:id="rId6"/>
+    <p:sldId id="261" r:id="rId7"/>
   </p:sldIdLst>
   <p:sldSz cx="12192000" cy="6858000"/>
   <p:notesSz cx="6858000" cy="9144000"/>
@@ -198,7 +202,7 @@
           <a:p>
             <a:fld id="{5549AB31-C21E-4C3B-B1A0-0CB868F832B2}" type="datetimeFigureOut">
               <a:rPr lang="en-US" smtClean="0"/>
-              <a:t>2025-10-25</a:t>
+              <a:t>10/28/2025</a:t>
             </a:fld>
             <a:endParaRPr lang="en-US"/>
           </a:p>
@@ -612,7 +616,7 @@
           <a:p>
             <a:fld id="{3365F9F5-D4B5-4EB9-A01F-29DBFF511CA8}" type="datetimeFigureOut">
               <a:rPr lang="en-US" smtClean="0"/>
-              <a:t>2025-10-25</a:t>
+              <a:t>10/28/2025</a:t>
             </a:fld>
             <a:endParaRPr lang="en-US"/>
           </a:p>
@@ -810,7 +814,7 @@
           <a:p>
             <a:fld id="{3365F9F5-D4B5-4EB9-A01F-29DBFF511CA8}" type="datetimeFigureOut">
               <a:rPr lang="en-US" smtClean="0"/>
-              <a:t>2025-10-25</a:t>
+              <a:t>10/28/2025</a:t>
             </a:fld>
             <a:endParaRPr lang="en-US"/>
           </a:p>
@@ -1018,7 +1022,7 @@
           <a:p>
             <a:fld id="{3365F9F5-D4B5-4EB9-A01F-29DBFF511CA8}" type="datetimeFigureOut">
               <a:rPr lang="en-US" smtClean="0"/>
-              <a:t>2025-10-25</a:t>
+              <a:t>10/28/2025</a:t>
             </a:fld>
             <a:endParaRPr lang="en-US"/>
           </a:p>
@@ -1216,7 +1220,7 @@
           <a:p>
             <a:fld id="{3365F9F5-D4B5-4EB9-A01F-29DBFF511CA8}" type="datetimeFigureOut">
               <a:rPr lang="en-US" smtClean="0"/>
-              <a:t>2025-10-25</a:t>
+              <a:t>10/28/2025</a:t>
             </a:fld>
             <a:endParaRPr lang="en-US"/>
           </a:p>
@@ -1491,7 +1495,7 @@
           <a:p>
             <a:fld id="{3365F9F5-D4B5-4EB9-A01F-29DBFF511CA8}" type="datetimeFigureOut">
               <a:rPr lang="en-US" smtClean="0"/>
-              <a:t>2025-10-25</a:t>
+              <a:t>10/28/2025</a:t>
             </a:fld>
             <a:endParaRPr lang="en-US"/>
           </a:p>
@@ -1756,7 +1760,7 @@
           <a:p>
             <a:fld id="{3365F9F5-D4B5-4EB9-A01F-29DBFF511CA8}" type="datetimeFigureOut">
               <a:rPr lang="en-US" smtClean="0"/>
-              <a:t>2025-10-25</a:t>
+              <a:t>10/28/2025</a:t>
             </a:fld>
             <a:endParaRPr lang="en-US"/>
           </a:p>
@@ -2168,7 +2172,7 @@
           <a:p>
             <a:fld id="{3365F9F5-D4B5-4EB9-A01F-29DBFF511CA8}" type="datetimeFigureOut">
               <a:rPr lang="en-US" smtClean="0"/>
-              <a:t>2025-10-25</a:t>
+              <a:t>10/28/2025</a:t>
             </a:fld>
             <a:endParaRPr lang="en-US"/>
           </a:p>
@@ -2309,7 +2313,7 @@
           <a:p>
             <a:fld id="{3365F9F5-D4B5-4EB9-A01F-29DBFF511CA8}" type="datetimeFigureOut">
               <a:rPr lang="en-US" smtClean="0"/>
-              <a:t>2025-10-25</a:t>
+              <a:t>10/28/2025</a:t>
             </a:fld>
             <a:endParaRPr lang="en-US"/>
           </a:p>
@@ -2422,7 +2426,7 @@
           <a:p>
             <a:fld id="{3365F9F5-D4B5-4EB9-A01F-29DBFF511CA8}" type="datetimeFigureOut">
               <a:rPr lang="en-US" smtClean="0"/>
-              <a:t>2025-10-25</a:t>
+              <a:t>10/28/2025</a:t>
             </a:fld>
             <a:endParaRPr lang="en-US"/>
           </a:p>
@@ -2733,7 +2737,7 @@
           <a:p>
             <a:fld id="{3365F9F5-D4B5-4EB9-A01F-29DBFF511CA8}" type="datetimeFigureOut">
               <a:rPr lang="en-US" smtClean="0"/>
-              <a:t>2025-10-25</a:t>
+              <a:t>10/28/2025</a:t>
             </a:fld>
             <a:endParaRPr lang="en-US"/>
           </a:p>
@@ -3021,7 +3025,7 @@
           <a:p>
             <a:fld id="{3365F9F5-D4B5-4EB9-A01F-29DBFF511CA8}" type="datetimeFigureOut">
               <a:rPr lang="en-US" smtClean="0"/>
-              <a:t>2025-10-25</a:t>
+              <a:t>10/28/2025</a:t>
             </a:fld>
             <a:endParaRPr lang="en-US"/>
           </a:p>
@@ -3262,7 +3266,7 @@
           <a:p>
             <a:fld id="{3365F9F5-D4B5-4EB9-A01F-29DBFF511CA8}" type="datetimeFigureOut">
               <a:rPr lang="en-US" smtClean="0"/>
-              <a:t>2025-10-25</a:t>
+              <a:t>10/28/2025</a:t>
             </a:fld>
             <a:endParaRPr lang="en-US"/>
           </a:p>
@@ -3796,11 +3800,12 @@
           <a:lstStyle/>
           <a:p>
             <a:r>
-              <a:rPr lang="en-US" dirty="0">
-                <a:latin typeface="Abadi" panose="020B0604020104020204" pitchFamily="34" charset="0"/>
-              </a:rPr>
-              <a:t>Title</a:t>
-            </a:r>
+              <a:rPr lang="en-GB" dirty="0"/>
+              <a:t>Implications for alignment research</a:t>
+            </a:r>
+            <a:endParaRPr lang="en-US" dirty="0">
+              <a:latin typeface="Abadi" panose="020B0604020104020204" pitchFamily="34" charset="0"/>
+            </a:endParaRPr>
           </a:p>
         </p:txBody>
       </p:sp>
@@ -3822,8 +3827,8 @@
         </p:nvSpPr>
         <p:spPr>
           <a:xfrm>
-            <a:off x="532151" y="1491521"/>
-            <a:ext cx="11407515" cy="4991726"/>
+            <a:off x="532152" y="1491521"/>
+            <a:ext cx="8856398" cy="4991726"/>
           </a:xfrm>
         </p:spPr>
         <p:txBody>
@@ -3831,6 +3836,36 @@
             <a:normAutofit/>
           </a:bodyPr>
           <a:lstStyle/>
+          <a:p>
+            <a:pPr lvl="0"/>
+            <a:r>
+              <a:rPr lang="en-GB" sz="2400" dirty="0"/>
+              <a:t>The cost of increasing model alignment is modest to relative to pretraining</a:t>
+            </a:r>
+          </a:p>
+          <a:p>
+            <a:pPr lvl="0"/>
+            <a:r>
+              <a:rPr lang="en-GB" sz="2400" dirty="0"/>
+              <a:t>The model generalizes instructions to settings that it wasn’t supervised in</a:t>
+            </a:r>
+          </a:p>
+          <a:p>
+            <a:pPr lvl="0"/>
+            <a:r>
+              <a:rPr lang="en-GB" sz="2400" dirty="0"/>
+              <a:t>Performance degradation was mitigated by the fine-tuning.</a:t>
+            </a:r>
+            <a:endParaRPr lang="pt-PT" sz="2400" dirty="0"/>
+          </a:p>
+          <a:p>
+            <a:pPr lvl="0"/>
+            <a:r>
+              <a:rPr lang="en-GB" sz="2400" dirty="0"/>
+              <a:t>The techniques were validated from research of the real world.</a:t>
+            </a:r>
+            <a:endParaRPr lang="pt-PT" sz="2400" dirty="0"/>
+          </a:p>
           <a:p>
             <a:pPr marL="0" indent="0">
               <a:lnSpc>
@@ -3838,12 +3873,9 @@
               </a:lnSpc>
               <a:buNone/>
             </a:pPr>
-            <a:r>
-              <a:rPr lang="en-US" dirty="0">
-                <a:latin typeface="Abadi" panose="020B0604020104020204" pitchFamily="34" charset="0"/>
-              </a:rPr>
-              <a:t>Content</a:t>
-            </a:r>
+            <a:endParaRPr lang="en-US" dirty="0">
+              <a:latin typeface="Abadi" panose="020B0604020104020204" pitchFamily="34" charset="0"/>
+            </a:endParaRPr>
           </a:p>
         </p:txBody>
       </p:sp>
@@ -3851,6 +3883,448 @@
     <p:extLst>
       <p:ext uri="{BB962C8B-B14F-4D97-AF65-F5344CB8AC3E}">
         <p14:creationId xmlns:p14="http://schemas.microsoft.com/office/powerpoint/2010/main" val="444257243"/>
+      </p:ext>
+    </p:extLst>
+  </p:cSld>
+  <p:clrMapOvr>
+    <a:masterClrMapping/>
+  </p:clrMapOvr>
+</p:sld>
+</file>
+
+<file path=ppt/slides/slide3.xml><?xml version="1.0" encoding="utf-8"?>
+<p:sld xmlns:a="http://schemas.openxmlformats.org/drawingml/2006/main" xmlns:r="http://schemas.openxmlformats.org/officeDocument/2006/relationships" xmlns:p="http://schemas.openxmlformats.org/presentationml/2006/main">
+  <p:cSld>
+    <p:spTree>
+      <p:nvGrpSpPr>
+        <p:cNvPr id="1" name=""/>
+        <p:cNvGrpSpPr/>
+        <p:nvPr/>
+      </p:nvGrpSpPr>
+      <p:grpSpPr>
+        <a:xfrm>
+          <a:off x="0" y="0"/>
+          <a:ext cx="0" cy="0"/>
+          <a:chOff x="0" y="0"/>
+          <a:chExt cx="0" cy="0"/>
+        </a:xfrm>
+      </p:grpSpPr>
+      <p:sp>
+        <p:nvSpPr>
+          <p:cNvPr id="2" name="Title 1">
+            <a:extLst>
+              <a:ext uri="{FF2B5EF4-FFF2-40B4-BE49-F238E27FC236}">
+                <a16:creationId xmlns:a16="http://schemas.microsoft.com/office/drawing/2014/main" id="{A1C9B15A-B047-521B-DBF1-B509C05F7D95}"/>
+              </a:ext>
+            </a:extLst>
+          </p:cNvPr>
+          <p:cNvSpPr>
+            <a:spLocks noGrp="1"/>
+          </p:cNvSpPr>
+          <p:nvPr>
+            <p:ph type="title"/>
+          </p:nvPr>
+        </p:nvSpPr>
+        <p:spPr/>
+        <p:txBody>
+          <a:bodyPr/>
+          <a:lstStyle/>
+          <a:p>
+            <a:r>
+              <a:rPr lang="en-GB" dirty="0"/>
+              <a:t>Who are we aligning to?</a:t>
+            </a:r>
+            <a:endParaRPr lang="pt-PT" dirty="0"/>
+          </a:p>
+        </p:txBody>
+      </p:sp>
+      <p:sp>
+        <p:nvSpPr>
+          <p:cNvPr id="3" name="Content Placeholder 2">
+            <a:extLst>
+              <a:ext uri="{FF2B5EF4-FFF2-40B4-BE49-F238E27FC236}">
+                <a16:creationId xmlns:a16="http://schemas.microsoft.com/office/drawing/2014/main" id="{818FB10B-833B-55E0-4920-C4FE776BCAF3}"/>
+              </a:ext>
+            </a:extLst>
+          </p:cNvPr>
+          <p:cNvSpPr>
+            <a:spLocks noGrp="1"/>
+          </p:cNvSpPr>
+          <p:nvPr>
+            <p:ph idx="1"/>
+          </p:nvPr>
+        </p:nvSpPr>
+        <p:spPr>
+          <a:xfrm>
+            <a:off x="838200" y="1825625"/>
+            <a:ext cx="8911856" cy="4351338"/>
+          </a:xfrm>
+        </p:spPr>
+        <p:txBody>
+          <a:bodyPr>
+            <a:normAutofit/>
+          </a:bodyPr>
+          <a:lstStyle/>
+          <a:p>
+            <a:pPr lvl="0"/>
+            <a:r>
+              <a:rPr lang="en-GB" sz="2400" dirty="0"/>
+              <a:t>The model is aligned to the labeller’s demonstrations and preferences. The labeller’s were mostly English‐speaking people </a:t>
+            </a:r>
+          </a:p>
+          <a:p>
+            <a:pPr lvl="0"/>
+            <a:r>
+              <a:rPr lang="en-GB" sz="2400" dirty="0"/>
+              <a:t>The labelling instructions are created by the researcher’s, creating an inherent bias to their preferences.</a:t>
+            </a:r>
+            <a:endParaRPr lang="pt-PT" sz="2400" dirty="0"/>
+          </a:p>
+          <a:p>
+            <a:pPr lvl="0"/>
+            <a:r>
+              <a:rPr lang="en-GB" sz="2400" dirty="0"/>
+              <a:t>The training data is determined by prompts sent by customers, and as such, implicitly aligning with what customers think is valuable</a:t>
+            </a:r>
+            <a:endParaRPr lang="pt-PT" sz="2400" dirty="0"/>
+          </a:p>
+          <a:p>
+            <a:pPr lvl="0"/>
+            <a:r>
+              <a:rPr lang="en-GB" sz="2400" dirty="0"/>
+              <a:t>The customers of OpenAI are not representative of all potential users, nor by all individuals and groups impacted by language model use</a:t>
+            </a:r>
+            <a:endParaRPr lang="pt-PT" sz="2400" dirty="0"/>
+          </a:p>
+          <a:p>
+            <a:endParaRPr lang="pt-PT" sz="2400" dirty="0"/>
+          </a:p>
+        </p:txBody>
+      </p:sp>
+    </p:spTree>
+    <p:extLst>
+      <p:ext uri="{BB962C8B-B14F-4D97-AF65-F5344CB8AC3E}">
+        <p14:creationId xmlns:p14="http://schemas.microsoft.com/office/powerpoint/2010/main" val="1598766342"/>
+      </p:ext>
+    </p:extLst>
+  </p:cSld>
+  <p:clrMapOvr>
+    <a:masterClrMapping/>
+  </p:clrMapOvr>
+</p:sld>
+</file>
+
+<file path=ppt/slides/slide4.xml><?xml version="1.0" encoding="utf-8"?>
+<p:sld xmlns:a="http://schemas.openxmlformats.org/drawingml/2006/main" xmlns:r="http://schemas.openxmlformats.org/officeDocument/2006/relationships" xmlns:p="http://schemas.openxmlformats.org/presentationml/2006/main">
+  <p:cSld>
+    <p:spTree>
+      <p:nvGrpSpPr>
+        <p:cNvPr id="1" name=""/>
+        <p:cNvGrpSpPr/>
+        <p:nvPr/>
+      </p:nvGrpSpPr>
+      <p:grpSpPr>
+        <a:xfrm>
+          <a:off x="0" y="0"/>
+          <a:ext cx="0" cy="0"/>
+          <a:chOff x="0" y="0"/>
+          <a:chExt cx="0" cy="0"/>
+        </a:xfrm>
+      </p:grpSpPr>
+      <p:sp>
+        <p:nvSpPr>
+          <p:cNvPr id="2" name="Title 1">
+            <a:extLst>
+              <a:ext uri="{FF2B5EF4-FFF2-40B4-BE49-F238E27FC236}">
+                <a16:creationId xmlns:a16="http://schemas.microsoft.com/office/drawing/2014/main" id="{181DD012-10D4-225E-A862-89C9FF0A0AA5}"/>
+              </a:ext>
+            </a:extLst>
+          </p:cNvPr>
+          <p:cNvSpPr>
+            <a:spLocks noGrp="1"/>
+          </p:cNvSpPr>
+          <p:nvPr>
+            <p:ph type="title"/>
+          </p:nvPr>
+        </p:nvSpPr>
+        <p:spPr/>
+        <p:txBody>
+          <a:bodyPr/>
+          <a:lstStyle/>
+          <a:p>
+            <a:r>
+              <a:rPr lang="en-GB" dirty="0"/>
+              <a:t>Limitations</a:t>
+            </a:r>
+            <a:endParaRPr lang="pt-PT" dirty="0"/>
+          </a:p>
+        </p:txBody>
+      </p:sp>
+      <p:sp>
+        <p:nvSpPr>
+          <p:cNvPr id="3" name="Content Placeholder 2">
+            <a:extLst>
+              <a:ext uri="{FF2B5EF4-FFF2-40B4-BE49-F238E27FC236}">
+                <a16:creationId xmlns:a16="http://schemas.microsoft.com/office/drawing/2014/main" id="{A211F169-052A-8C4C-C1B1-9FB8B97F9E4E}"/>
+              </a:ext>
+            </a:extLst>
+          </p:cNvPr>
+          <p:cNvSpPr>
+            <a:spLocks noGrp="1"/>
+          </p:cNvSpPr>
+          <p:nvPr>
+            <p:ph idx="1"/>
+          </p:nvPr>
+        </p:nvSpPr>
+        <p:spPr>
+          <a:xfrm>
+            <a:off x="838200" y="1825625"/>
+            <a:ext cx="7550888" cy="4351338"/>
+          </a:xfrm>
+        </p:spPr>
+        <p:txBody>
+          <a:bodyPr>
+            <a:normAutofit/>
+          </a:bodyPr>
+          <a:lstStyle/>
+          <a:p>
+            <a:r>
+              <a:rPr lang="en-GB" sz="2400" dirty="0"/>
+              <a:t>The labeller population is not fully representative of all users or all cultural/linguistic backgrounds. Most prompts and data were in English, and many of the comparisons were labelled by only one annotator.</a:t>
+            </a:r>
+          </a:p>
+          <a:p>
+            <a:r>
+              <a:rPr lang="en-GB" sz="2400" dirty="0"/>
+              <a:t>The model sometimes would fail to follow instructions, hallucinate facts, generate biased or toxic outputs, or comply with harmful user instructions.</a:t>
+            </a:r>
+            <a:endParaRPr lang="pt-PT" sz="2400" dirty="0"/>
+          </a:p>
+        </p:txBody>
+      </p:sp>
+    </p:spTree>
+    <p:extLst>
+      <p:ext uri="{BB962C8B-B14F-4D97-AF65-F5344CB8AC3E}">
+        <p14:creationId xmlns:p14="http://schemas.microsoft.com/office/powerpoint/2010/main" val="3831542408"/>
+      </p:ext>
+    </p:extLst>
+  </p:cSld>
+  <p:clrMapOvr>
+    <a:masterClrMapping/>
+  </p:clrMapOvr>
+</p:sld>
+</file>
+
+<file path=ppt/slides/slide5.xml><?xml version="1.0" encoding="utf-8"?>
+<p:sld xmlns:a="http://schemas.openxmlformats.org/drawingml/2006/main" xmlns:r="http://schemas.openxmlformats.org/officeDocument/2006/relationships" xmlns:p="http://schemas.openxmlformats.org/presentationml/2006/main">
+  <p:cSld>
+    <p:spTree>
+      <p:nvGrpSpPr>
+        <p:cNvPr id="1" name=""/>
+        <p:cNvGrpSpPr/>
+        <p:nvPr/>
+      </p:nvGrpSpPr>
+      <p:grpSpPr>
+        <a:xfrm>
+          <a:off x="0" y="0"/>
+          <a:ext cx="0" cy="0"/>
+          <a:chOff x="0" y="0"/>
+          <a:chExt cx="0" cy="0"/>
+        </a:xfrm>
+      </p:grpSpPr>
+      <p:sp>
+        <p:nvSpPr>
+          <p:cNvPr id="2" name="Title 1">
+            <a:extLst>
+              <a:ext uri="{FF2B5EF4-FFF2-40B4-BE49-F238E27FC236}">
+                <a16:creationId xmlns:a16="http://schemas.microsoft.com/office/drawing/2014/main" id="{AE9B55A0-E705-CF68-E0A7-74777D207EC3}"/>
+              </a:ext>
+            </a:extLst>
+          </p:cNvPr>
+          <p:cNvSpPr>
+            <a:spLocks noGrp="1"/>
+          </p:cNvSpPr>
+          <p:nvPr>
+            <p:ph type="title"/>
+          </p:nvPr>
+        </p:nvSpPr>
+        <p:spPr/>
+        <p:txBody>
+          <a:bodyPr/>
+          <a:lstStyle/>
+          <a:p>
+            <a:r>
+              <a:rPr lang="en-GB" dirty="0"/>
+              <a:t>Open questions</a:t>
+            </a:r>
+            <a:endParaRPr lang="pt-PT" dirty="0"/>
+          </a:p>
+        </p:txBody>
+      </p:sp>
+      <p:sp>
+        <p:nvSpPr>
+          <p:cNvPr id="3" name="Content Placeholder 2">
+            <a:extLst>
+              <a:ext uri="{FF2B5EF4-FFF2-40B4-BE49-F238E27FC236}">
+                <a16:creationId xmlns:a16="http://schemas.microsoft.com/office/drawing/2014/main" id="{821FA593-D2B0-29CD-2FD6-09FA447167B3}"/>
+              </a:ext>
+            </a:extLst>
+          </p:cNvPr>
+          <p:cNvSpPr>
+            <a:spLocks noGrp="1"/>
+          </p:cNvSpPr>
+          <p:nvPr>
+            <p:ph idx="1"/>
+          </p:nvPr>
+        </p:nvSpPr>
+        <p:spPr/>
+        <p:txBody>
+          <a:bodyPr>
+            <a:normAutofit/>
+          </a:bodyPr>
+          <a:lstStyle/>
+          <a:p>
+            <a:r>
+              <a:rPr lang="en-GB" sz="2400" dirty="0"/>
+              <a:t>Collection of worst-case scenarios, filtering pre-training data, and combining different methods to reduce the propensity to generate toxic outputs</a:t>
+            </a:r>
+          </a:p>
+          <a:p>
+            <a:r>
+              <a:rPr lang="en-GB" sz="2400" dirty="0"/>
+              <a:t>Whether an output is harmful will depend on the context. Also, harmful outputs can be beneficial for data augmentation.</a:t>
+            </a:r>
+            <a:endParaRPr lang="pt-PT" sz="2400" dirty="0"/>
+          </a:p>
+          <a:p>
+            <a:r>
+              <a:rPr lang="en-GB" sz="2400" dirty="0"/>
+              <a:t>To improve the controllability of the model it may be useful to allow users to specify preferences</a:t>
+            </a:r>
+          </a:p>
+          <a:p>
+            <a:r>
+              <a:rPr lang="en-GB" sz="2400" dirty="0"/>
+              <a:t>Making comparisons of text may not be the best way to align models</a:t>
+            </a:r>
+            <a:endParaRPr lang="pt-PT" sz="2400" dirty="0"/>
+          </a:p>
+        </p:txBody>
+      </p:sp>
+    </p:spTree>
+    <p:extLst>
+      <p:ext uri="{BB962C8B-B14F-4D97-AF65-F5344CB8AC3E}">
+        <p14:creationId xmlns:p14="http://schemas.microsoft.com/office/powerpoint/2010/main" val="1009892861"/>
+      </p:ext>
+    </p:extLst>
+  </p:cSld>
+  <p:clrMapOvr>
+    <a:masterClrMapping/>
+  </p:clrMapOvr>
+</p:sld>
+</file>
+
+<file path=ppt/slides/slide6.xml><?xml version="1.0" encoding="utf-8"?>
+<p:sld xmlns:a="http://schemas.openxmlformats.org/drawingml/2006/main" xmlns:r="http://schemas.openxmlformats.org/officeDocument/2006/relationships" xmlns:p="http://schemas.openxmlformats.org/presentationml/2006/main">
+  <p:cSld>
+    <p:spTree>
+      <p:nvGrpSpPr>
+        <p:cNvPr id="1" name=""/>
+        <p:cNvGrpSpPr/>
+        <p:nvPr/>
+      </p:nvGrpSpPr>
+      <p:grpSpPr>
+        <a:xfrm>
+          <a:off x="0" y="0"/>
+          <a:ext cx="0" cy="0"/>
+          <a:chOff x="0" y="0"/>
+          <a:chExt cx="0" cy="0"/>
+        </a:xfrm>
+      </p:grpSpPr>
+      <p:sp>
+        <p:nvSpPr>
+          <p:cNvPr id="2" name="Title 1">
+            <a:extLst>
+              <a:ext uri="{FF2B5EF4-FFF2-40B4-BE49-F238E27FC236}">
+                <a16:creationId xmlns:a16="http://schemas.microsoft.com/office/drawing/2014/main" id="{4D4D662A-1550-FECC-9C0B-2133531728D1}"/>
+              </a:ext>
+            </a:extLst>
+          </p:cNvPr>
+          <p:cNvSpPr>
+            <a:spLocks noGrp="1"/>
+          </p:cNvSpPr>
+          <p:nvPr>
+            <p:ph type="title"/>
+          </p:nvPr>
+        </p:nvSpPr>
+        <p:spPr/>
+        <p:txBody>
+          <a:bodyPr/>
+          <a:lstStyle/>
+          <a:p>
+            <a:r>
+              <a:rPr lang="en-GB" dirty="0"/>
+              <a:t>Broader Impact</a:t>
+            </a:r>
+            <a:endParaRPr lang="pt-PT" dirty="0"/>
+          </a:p>
+        </p:txBody>
+      </p:sp>
+      <p:sp>
+        <p:nvSpPr>
+          <p:cNvPr id="3" name="Content Placeholder 2">
+            <a:extLst>
+              <a:ext uri="{FF2B5EF4-FFF2-40B4-BE49-F238E27FC236}">
+                <a16:creationId xmlns:a16="http://schemas.microsoft.com/office/drawing/2014/main" id="{B60E3C78-20CF-3A9B-3D5E-08C26751E45B}"/>
+              </a:ext>
+            </a:extLst>
+          </p:cNvPr>
+          <p:cNvSpPr>
+            <a:spLocks noGrp="1"/>
+          </p:cNvSpPr>
+          <p:nvPr>
+            <p:ph idx="1"/>
+          </p:nvPr>
+        </p:nvSpPr>
+        <p:spPr/>
+        <p:txBody>
+          <a:bodyPr/>
+          <a:lstStyle/>
+          <a:p>
+            <a:r>
+              <a:rPr lang="en-GB" sz="2400" dirty="0"/>
+              <a:t>Deployment carries risks of bias, misalignment with under‐represented groups, or unintended consequences.</a:t>
+            </a:r>
+            <a:endParaRPr lang="pt-PT" sz="2400" dirty="0"/>
+          </a:p>
+          <a:p>
+            <a:r>
+              <a:rPr lang="en-GB" sz="2400" dirty="0"/>
+              <a:t>Persuasive text may increase usage time, which may not be good for the user’s well-being.</a:t>
+            </a:r>
+          </a:p>
+          <a:p>
+            <a:r>
+              <a:rPr lang="en-GB" sz="2400" dirty="0"/>
+              <a:t>Ensure models are used responsibly, that their alignment target is revisited as deployment contexts change</a:t>
+            </a:r>
+          </a:p>
+          <a:p>
+            <a:r>
+              <a:rPr lang="en-GB" sz="2400" dirty="0"/>
+              <a:t>Data filtering, monitoring, refusing harmful instructions are also necessary.</a:t>
+            </a:r>
+            <a:endParaRPr lang="pt-PT" sz="2400" dirty="0"/>
+          </a:p>
+          <a:p>
+            <a:endParaRPr lang="pt-PT" dirty="0"/>
+          </a:p>
+        </p:txBody>
+      </p:sp>
+    </p:spTree>
+    <p:extLst>
+      <p:ext uri="{BB962C8B-B14F-4D97-AF65-F5344CB8AC3E}">
+        <p14:creationId xmlns:p14="http://schemas.microsoft.com/office/powerpoint/2010/main" val="1059793759"/>
       </p:ext>
     </p:extLst>
   </p:cSld>

</xml_diff>